<commit_message>
Rectified mistyped equation for weight update
</commit_message>
<xml_diff>
--- a/Lectures/Lecture 10_Regularization.pptx
+++ b/Lectures/Lecture 10_Regularization.pptx
@@ -264,7 +264,7 @@
           <a:p>
             <a:fld id="{3FE918EF-26F2-F641-9B39-65E2E78847ED}" type="datetimeFigureOut">
               <a:rPr lang="en-US" smtClean="0"/>
-              <a:t>10/6/23</a:t>
+              <a:t>10/13/23</a:t>
             </a:fld>
             <a:endParaRPr lang="en-US"/>
           </a:p>
@@ -1826,7 +1826,7 @@
             <a:fld id="{23A271A1-F6D6-438B-A432-4747EE7ECD40}" type="datetimeFigureOut">
               <a:rPr lang="en-US" smtClean="0"/>
               <a:pPr algn="ctr" eaLnBrk="1" latinLnBrk="0" hangingPunct="1"/>
-              <a:t>10/6/23</a:t>
+              <a:t>10/13/23</a:t>
             </a:fld>
             <a:endParaRPr lang="en-US" sz="2000" dirty="0">
               <a:solidFill>
@@ -2032,7 +2032,7 @@
             <a:fld id="{23A271A1-F6D6-438B-A432-4747EE7ECD40}" type="datetimeFigureOut">
               <a:rPr lang="en-US" smtClean="0"/>
               <a:pPr eaLnBrk="1" latinLnBrk="0" hangingPunct="1"/>
-              <a:t>10/6/23</a:t>
+              <a:t>10/13/23</a:t>
             </a:fld>
             <a:endParaRPr lang="en-US"/>
           </a:p>
@@ -2219,7 +2219,7 @@
             <a:fld id="{23A271A1-F6D6-438B-A432-4747EE7ECD40}" type="datetimeFigureOut">
               <a:rPr lang="en-US" smtClean="0"/>
               <a:pPr eaLnBrk="1" latinLnBrk="0" hangingPunct="1"/>
-              <a:t>10/6/23</a:t>
+              <a:t>10/13/23</a:t>
             </a:fld>
             <a:endParaRPr lang="en-US" dirty="0"/>
           </a:p>
@@ -2484,7 +2484,7 @@
             <a:fld id="{23A271A1-F6D6-438B-A432-4747EE7ECD40}" type="datetimeFigureOut">
               <a:rPr lang="en-US" smtClean="0"/>
               <a:pPr eaLnBrk="1" latinLnBrk="0" hangingPunct="1"/>
-              <a:t>10/6/23</a:t>
+              <a:t>10/13/23</a:t>
             </a:fld>
             <a:endParaRPr lang="en-US" dirty="0"/>
           </a:p>
@@ -2906,7 +2906,7 @@
             <a:fld id="{23A271A1-F6D6-438B-A432-4747EE7ECD40}" type="datetimeFigureOut">
               <a:rPr lang="en-US" smtClean="0"/>
               <a:pPr eaLnBrk="1" latinLnBrk="0" hangingPunct="1"/>
-              <a:t>10/6/23</a:t>
+              <a:t>10/13/23</a:t>
             </a:fld>
             <a:endParaRPr lang="en-US"/>
           </a:p>
@@ -3155,7 +3155,7 @@
             <a:fld id="{23A271A1-F6D6-438B-A432-4747EE7ECD40}" type="datetimeFigureOut">
               <a:rPr lang="en-US" smtClean="0"/>
               <a:pPr eaLnBrk="1" latinLnBrk="0" hangingPunct="1"/>
-              <a:t>10/6/23</a:t>
+              <a:t>10/13/23</a:t>
             </a:fld>
             <a:endParaRPr lang="en-US"/>
           </a:p>
@@ -3394,7 +3394,7 @@
             <a:fld id="{23A271A1-F6D6-438B-A432-4747EE7ECD40}" type="datetimeFigureOut">
               <a:rPr lang="en-US" smtClean="0"/>
               <a:pPr eaLnBrk="1" latinLnBrk="0" hangingPunct="1"/>
-              <a:t>10/6/23</a:t>
+              <a:t>10/13/23</a:t>
             </a:fld>
             <a:endParaRPr lang="en-US"/>
           </a:p>
@@ -3592,7 +3592,7 @@
             <a:fld id="{23A271A1-F6D6-438B-A432-4747EE7ECD40}" type="datetimeFigureOut">
               <a:rPr lang="en-US" smtClean="0"/>
               <a:pPr eaLnBrk="1" latinLnBrk="0" hangingPunct="1"/>
-              <a:t>10/6/23</a:t>
+              <a:t>10/13/23</a:t>
             </a:fld>
             <a:endParaRPr lang="en-US"/>
           </a:p>
@@ -3697,7 +3697,7 @@
             <a:fld id="{23A271A1-F6D6-438B-A432-4747EE7ECD40}" type="datetimeFigureOut">
               <a:rPr lang="en-US" smtClean="0"/>
               <a:pPr eaLnBrk="1" latinLnBrk="0" hangingPunct="1"/>
-              <a:t>10/6/23</a:t>
+              <a:t>10/13/23</a:t>
             </a:fld>
             <a:endParaRPr lang="en-US"/>
           </a:p>
@@ -3839,7 +3839,7 @@
             <a:fld id="{23A271A1-F6D6-438B-A432-4747EE7ECD40}" type="datetimeFigureOut">
               <a:rPr lang="en-US" smtClean="0"/>
               <a:pPr eaLnBrk="1" latinLnBrk="0" hangingPunct="1"/>
-              <a:t>10/6/23</a:t>
+              <a:t>10/13/23</a:t>
             </a:fld>
             <a:endParaRPr lang="en-US"/>
           </a:p>
@@ -4363,7 +4363,7 @@
             <a:fld id="{23A271A1-F6D6-438B-A432-4747EE7ECD40}" type="datetimeFigureOut">
               <a:rPr lang="en-US" smtClean="0"/>
               <a:pPr eaLnBrk="1" latinLnBrk="0" hangingPunct="1"/>
-              <a:t>10/6/23</a:t>
+              <a:t>10/13/23</a:t>
             </a:fld>
             <a:endParaRPr lang="en-US"/>
           </a:p>
@@ -4626,7 +4626,7 @@
             <a:fld id="{23A271A1-F6D6-438B-A432-4747EE7ECD40}" type="datetimeFigureOut">
               <a:rPr lang="en-US" smtClean="0"/>
               <a:pPr eaLnBrk="1" latinLnBrk="0" hangingPunct="1"/>
-              <a:t>10/6/23</a:t>
+              <a:t>10/13/23</a:t>
             </a:fld>
             <a:endParaRPr lang="en-US" sz="1400" dirty="0">
               <a:solidFill>
@@ -6989,7 +6989,7 @@
                       <a:noFill/>
                       <a:extLst>
                         <a:ext uri="{909E8E84-426E-40dd-AFC4-6F175D3DCCD1}">
-                          <a14:hiddenFill xmlns="" xmlns:a14="http://schemas.microsoft.com/office/drawing/2010/main">
+                          <a14:hiddenFill xmlns:a14="http://schemas.microsoft.com/office/drawing/2010/main" xmlns="">
                             <a:solidFill>
                               <a:srgbClr val="FFFFFF"/>
                             </a:solidFill>
@@ -7362,7 +7362,7 @@
                       <a:noFill/>
                       <a:extLst>
                         <a:ext uri="{909E8E84-426E-40dd-AFC4-6F175D3DCCD1}">
-                          <a14:hiddenFill xmlns="" xmlns:a14="http://schemas.microsoft.com/office/drawing/2010/main">
+                          <a14:hiddenFill xmlns:a14="http://schemas.microsoft.com/office/drawing/2010/main" xmlns="">
                             <a:solidFill>
                               <a:srgbClr val="FFFFFF"/>
                             </a:solidFill>
@@ -7463,7 +7463,7 @@
                       <a:noFill/>
                       <a:extLst>
                         <a:ext uri="{909E8E84-426E-40dd-AFC4-6F175D3DCCD1}">
-                          <a14:hiddenFill xmlns="" xmlns:a14="http://schemas.microsoft.com/office/drawing/2010/main">
+                          <a14:hiddenFill xmlns:a14="http://schemas.microsoft.com/office/drawing/2010/main" xmlns="">
                             <a:solidFill>
                               <a:srgbClr val="FFFFFF"/>
                             </a:solidFill>
@@ -7591,7 +7591,7 @@
                       <a:noFill/>
                       <a:extLst>
                         <a:ext uri="{909E8E84-426E-40dd-AFC4-6F175D3DCCD1}">
-                          <a14:hiddenFill xmlns="" xmlns:a14="http://schemas.microsoft.com/office/drawing/2010/main">
+                          <a14:hiddenFill xmlns:a14="http://schemas.microsoft.com/office/drawing/2010/main" xmlns="">
                             <a:solidFill>
                               <a:srgbClr val="FFFFFF"/>
                             </a:solidFill>
@@ -7789,7 +7789,7 @@
                       <a:noFill/>
                       <a:extLst>
                         <a:ext uri="{909E8E84-426E-40dd-AFC4-6F175D3DCCD1}">
-                          <a14:hiddenFill xmlns="" xmlns:a14="http://schemas.microsoft.com/office/drawing/2010/main">
+                          <a14:hiddenFill xmlns:a14="http://schemas.microsoft.com/office/drawing/2010/main" xmlns="">
                             <a:solidFill>
                               <a:srgbClr val="FFFFFF"/>
                             </a:solidFill>
@@ -8293,7 +8293,7 @@
                       <a:noFill/>
                       <a:extLst>
                         <a:ext uri="{909E8E84-426E-40dd-AFC4-6F175D3DCCD1}">
-                          <a14:hiddenFill xmlns="" xmlns:a14="http://schemas.microsoft.com/office/drawing/2010/main">
+                          <a14:hiddenFill xmlns:a14="http://schemas.microsoft.com/office/drawing/2010/main" xmlns="">
                             <a:solidFill>
                               <a:srgbClr val="FFFFFF"/>
                             </a:solidFill>
@@ -17012,7 +17012,7 @@
                       <a:noFill/>
                       <a:extLst>
                         <a:ext uri="{909E8E84-426E-40dd-AFC4-6F175D3DCCD1}">
-                          <a14:hiddenFill xmlns="" xmlns:a14="http://schemas.microsoft.com/office/drawing/2010/main">
+                          <a14:hiddenFill xmlns:a14="http://schemas.microsoft.com/office/drawing/2010/main" xmlns="">
                             <a:solidFill>
                               <a:srgbClr val="FFFFFF"/>
                             </a:solidFill>
@@ -17656,7 +17656,7 @@
                       <a:noFill/>
                       <a:extLst>
                         <a:ext uri="{909E8E84-426E-40dd-AFC4-6F175D3DCCD1}">
-                          <a14:hiddenFill xmlns="" xmlns:a14="http://schemas.microsoft.com/office/drawing/2010/main">
+                          <a14:hiddenFill xmlns:a14="http://schemas.microsoft.com/office/drawing/2010/main" xmlns="">
                             <a:solidFill>
                               <a:srgbClr val="FFFFFF"/>
                             </a:solidFill>
@@ -20321,7 +20321,7 @@
                       <a:noFill/>
                       <a:extLst>
                         <a:ext uri="{909E8E84-426E-40dd-AFC4-6F175D3DCCD1}">
-                          <a14:hiddenFill xmlns="" xmlns:a14="http://schemas.microsoft.com/office/drawing/2010/main">
+                          <a14:hiddenFill xmlns:a14="http://schemas.microsoft.com/office/drawing/2010/main" xmlns="">
                             <a:solidFill>
                               <a:srgbClr val="FFFFFF"/>
                             </a:solidFill>
@@ -20982,7 +20982,7 @@
                       <a:noFill/>
                       <a:extLst>
                         <a:ext uri="{909E8E84-426E-40dd-AFC4-6F175D3DCCD1}">
-                          <a14:hiddenFill xmlns="" xmlns:a14="http://schemas.microsoft.com/office/drawing/2010/main">
+                          <a14:hiddenFill xmlns:a14="http://schemas.microsoft.com/office/drawing/2010/main" xmlns="">
                             <a:solidFill>
                               <a:srgbClr val="FFFFFF"/>
                             </a:solidFill>
@@ -21052,7 +21052,7 @@
                       <a:noFill/>
                       <a:extLst>
                         <a:ext uri="{909E8E84-426E-40dd-AFC4-6F175D3DCCD1}">
-                          <a14:hiddenFill xmlns="" xmlns:a14="http://schemas.microsoft.com/office/drawing/2010/main">
+                          <a14:hiddenFill xmlns:a14="http://schemas.microsoft.com/office/drawing/2010/main" xmlns="">
                             <a:solidFill>
                               <a:srgbClr val="FFFFFF"/>
                             </a:solidFill>
@@ -21283,14 +21283,14 @@
                         <a:latin typeface="Cambria Math" panose="02040503050406030204" pitchFamily="18" charset="0"/>
                         <a:ea typeface="Cambria Math" panose="02040503050406030204" pitchFamily="18" charset="0"/>
                       </a:rPr>
-                      <m:t>𝑦𝑖𝑥𝑖</m:t>
+                      <m:t>𝑦𝑖𝑥𝑖𝑗</m:t>
                     </m:r>
                     <m:r>
                       <a:rPr lang="en-US" sz="2400" b="0" i="1" baseline="-25000" dirty="0" smtClean="0">
                         <a:latin typeface="Cambria Math" panose="02040503050406030204" pitchFamily="18" charset="0"/>
                         <a:ea typeface="Cambria Math" panose="02040503050406030204" pitchFamily="18" charset="0"/>
                       </a:rPr>
-                      <m:t>𝑗𝑐</m:t>
+                      <m:t>𝑐</m:t>
                     </m:r>
                     <m:r>
                       <a:rPr lang="en-US" sz="2400" b="0" i="1" dirty="0" smtClean="0">
@@ -22067,16 +22067,20 @@
               <a:t>   for each training example (</a:t>
             </a:r>
             <a:r>
+              <a:rPr lang="en-US" sz="2400" i="1" dirty="0"/>
+              <a:t>x</a:t>
+            </a:r>
+            <a:r>
+              <a:rPr lang="en-US" sz="2400" i="1" baseline="-25000" dirty="0"/>
+              <a:t>i</a:t>
+            </a:r>
+            <a:r>
+              <a:rPr lang="en-US" sz="2400" i="1" dirty="0"/>
+              <a:t>, </a:t>
+            </a:r>
+            <a:r>
               <a:rPr lang="en-US" sz="2400" i="1" dirty="0" err="1"/>
-              <a:t>x</a:t>
-            </a:r>
-            <a:r>
-              <a:rPr lang="en-US" sz="2400" i="1" baseline="-25000" dirty="0" err="1"/>
-              <a:t>i</a:t>
-            </a:r>
-            <a:r>
-              <a:rPr lang="en-US" sz="2400" i="1" dirty="0" err="1"/>
-              <a:t>,y</a:t>
+              <a:t>y</a:t>
             </a:r>
             <a:r>
               <a:rPr lang="en-US" sz="2400" i="1" baseline="-25000" dirty="0" err="1"/>
@@ -22162,8 +22166,8 @@
           </a:p>
         </p:txBody>
       </p:sp>
-      <mc:AlternateContent xmlns:mc="http://schemas.openxmlformats.org/markup-compatibility/2006" xmlns:a14="http://schemas.microsoft.com/office/drawing/2010/main">
-        <mc:Choice Requires="a14">
+      <mc:AlternateContent xmlns:mc="http://schemas.openxmlformats.org/markup-compatibility/2006">
+        <mc:Choice xmlns:a14="http://schemas.microsoft.com/office/drawing/2010/main" Requires="a14">
           <p:sp>
             <p:nvSpPr>
               <p:cNvPr id="6" name="TextBox 5">
@@ -22179,7 +22183,7 @@
             <p:spPr>
               <a:xfrm>
                 <a:off x="1621950" y="3429000"/>
-                <a:ext cx="3489866" cy="461665"/>
+                <a:ext cx="3553986" cy="461665"/>
               </a:xfrm>
               <a:prstGeom prst="rect">
                 <a:avLst/>
@@ -22260,14 +22264,28 @@
                         <a:latin typeface="Cambria Math" panose="02040503050406030204" pitchFamily="18" charset="0"/>
                         <a:ea typeface="Cambria Math" panose="02040503050406030204" pitchFamily="18" charset="0"/>
                       </a:rPr>
-                      <m:t>𝑦𝑖𝑥𝑖</m:t>
+                      <m:t>𝑦𝑖</m:t>
+                    </m:r>
+                    <m:r>
+                      <a:rPr lang="en-US" sz="2400" b="0" i="1" dirty="0" smtClean="0">
+                        <a:latin typeface="Cambria Math" panose="02040503050406030204" pitchFamily="18" charset="0"/>
+                        <a:ea typeface="Cambria Math" panose="02040503050406030204" pitchFamily="18" charset="0"/>
+                      </a:rPr>
+                      <m:t>𝑥</m:t>
                     </m:r>
                     <m:r>
                       <a:rPr lang="en-US" sz="2400" b="0" i="1" baseline="-25000" dirty="0" smtClean="0">
                         <a:latin typeface="Cambria Math" panose="02040503050406030204" pitchFamily="18" charset="0"/>
                         <a:ea typeface="Cambria Math" panose="02040503050406030204" pitchFamily="18" charset="0"/>
                       </a:rPr>
-                      <m:t>𝑗𝑐</m:t>
+                      <m:t>𝑖𝑗</m:t>
+                    </m:r>
+                    <m:r>
+                      <a:rPr lang="en-US" sz="2400" b="0" i="1" dirty="0" smtClean="0">
+                        <a:latin typeface="Cambria Math" panose="02040503050406030204" pitchFamily="18" charset="0"/>
+                        <a:ea typeface="Cambria Math" panose="02040503050406030204" pitchFamily="18" charset="0"/>
+                      </a:rPr>
+                      <m:t>𝑐</m:t>
                     </m:r>
                     <m:r>
                       <a:rPr lang="en-US" sz="2400" b="0" i="1" dirty="0" smtClean="0">
@@ -22304,7 +22322,7 @@
             </p:txBody>
           </p:sp>
         </mc:Choice>
-        <mc:Fallback xmlns="">
+        <mc:Fallback>
           <p:sp>
             <p:nvSpPr>
               <p:cNvPr id="6" name="TextBox 5">
@@ -22322,7 +22340,7 @@
             <p:spPr>
               <a:xfrm>
                 <a:off x="1621950" y="3429000"/>
-                <a:ext cx="3489866" cy="461665"/>
+                <a:ext cx="3553986" cy="461665"/>
               </a:xfrm>
               <a:prstGeom prst="rect">
                 <a:avLst/>
@@ -22330,7 +22348,7 @@
               <a:blipFill>
                 <a:blip r:embed="rId2"/>
                 <a:stretch>
-                  <a:fillRect r="-362" b="-21622"/>
+                  <a:fillRect b="-21622"/>
                 </a:stretch>
               </a:blipFill>
             </p:spPr>
@@ -22567,14 +22585,14 @@
                         <a:latin typeface="Cambria Math" panose="02040503050406030204" pitchFamily="18" charset="0"/>
                         <a:ea typeface="Cambria Math" panose="02040503050406030204" pitchFamily="18" charset="0"/>
                       </a:rPr>
-                      <m:t>𝑦𝑖𝑥𝑖</m:t>
+                      <m:t>𝑦𝑖𝑥𝑖𝑗</m:t>
                     </m:r>
                     <m:r>
                       <a:rPr lang="en-US" sz="2400" b="0" i="1" baseline="-25000" dirty="0" smtClean="0">
                         <a:latin typeface="Cambria Math" panose="02040503050406030204" pitchFamily="18" charset="0"/>
                         <a:ea typeface="Cambria Math" panose="02040503050406030204" pitchFamily="18" charset="0"/>
                       </a:rPr>
-                      <m:t>𝑗𝑐</m:t>
+                      <m:t>𝑐</m:t>
                     </m:r>
                     <m:r>
                       <a:rPr lang="en-US" sz="2400" b="0" i="1" dirty="0" smtClean="0">
@@ -23376,7 +23394,7 @@
                       <a:noFill/>
                       <a:extLst>
                         <a:ext uri="{909E8E84-426E-40dd-AFC4-6F175D3DCCD1}">
-                          <a14:hiddenFill xmlns="" xmlns:a14="http://schemas.microsoft.com/office/drawing/2010/main">
+                          <a14:hiddenFill xmlns:a14="http://schemas.microsoft.com/office/drawing/2010/main" xmlns="">
                             <a:solidFill>
                               <a:srgbClr val="FFFFFF"/>
                             </a:solidFill>
@@ -23446,7 +23464,7 @@
                       <a:noFill/>
                       <a:extLst>
                         <a:ext uri="{909E8E84-426E-40dd-AFC4-6F175D3DCCD1}">
-                          <a14:hiddenFill xmlns="" xmlns:a14="http://schemas.microsoft.com/office/drawing/2010/main">
+                          <a14:hiddenFill xmlns:a14="http://schemas.microsoft.com/office/drawing/2010/main" xmlns="">
                             <a:solidFill>
                               <a:srgbClr val="FFFFFF"/>
                             </a:solidFill>

</xml_diff>

<commit_message>
Revising for the second midterm
</commit_message>
<xml_diff>
--- a/Lectures/Lecture 10_Regularization.pptx
+++ b/Lectures/Lecture 10_Regularization.pptx
@@ -264,7 +264,7 @@
           <a:p>
             <a:fld id="{3FE918EF-26F2-F641-9B39-65E2E78847ED}" type="datetimeFigureOut">
               <a:rPr lang="en-US" smtClean="0"/>
-              <a:t>10/13/23</a:t>
+              <a:t>11/16/23</a:t>
             </a:fld>
             <a:endParaRPr lang="en-US"/>
           </a:p>
@@ -1826,7 +1826,7 @@
             <a:fld id="{23A271A1-F6D6-438B-A432-4747EE7ECD40}" type="datetimeFigureOut">
               <a:rPr lang="en-US" smtClean="0"/>
               <a:pPr algn="ctr" eaLnBrk="1" latinLnBrk="0" hangingPunct="1"/>
-              <a:t>10/13/23</a:t>
+              <a:t>11/16/23</a:t>
             </a:fld>
             <a:endParaRPr lang="en-US" sz="2000" dirty="0">
               <a:solidFill>
@@ -2032,7 +2032,7 @@
             <a:fld id="{23A271A1-F6D6-438B-A432-4747EE7ECD40}" type="datetimeFigureOut">
               <a:rPr lang="en-US" smtClean="0"/>
               <a:pPr eaLnBrk="1" latinLnBrk="0" hangingPunct="1"/>
-              <a:t>10/13/23</a:t>
+              <a:t>11/16/23</a:t>
             </a:fld>
             <a:endParaRPr lang="en-US"/>
           </a:p>
@@ -2219,7 +2219,7 @@
             <a:fld id="{23A271A1-F6D6-438B-A432-4747EE7ECD40}" type="datetimeFigureOut">
               <a:rPr lang="en-US" smtClean="0"/>
               <a:pPr eaLnBrk="1" latinLnBrk="0" hangingPunct="1"/>
-              <a:t>10/13/23</a:t>
+              <a:t>11/16/23</a:t>
             </a:fld>
             <a:endParaRPr lang="en-US" dirty="0"/>
           </a:p>
@@ -2484,7 +2484,7 @@
             <a:fld id="{23A271A1-F6D6-438B-A432-4747EE7ECD40}" type="datetimeFigureOut">
               <a:rPr lang="en-US" smtClean="0"/>
               <a:pPr eaLnBrk="1" latinLnBrk="0" hangingPunct="1"/>
-              <a:t>10/13/23</a:t>
+              <a:t>11/16/23</a:t>
             </a:fld>
             <a:endParaRPr lang="en-US" dirty="0"/>
           </a:p>
@@ -2906,7 +2906,7 @@
             <a:fld id="{23A271A1-F6D6-438B-A432-4747EE7ECD40}" type="datetimeFigureOut">
               <a:rPr lang="en-US" smtClean="0"/>
               <a:pPr eaLnBrk="1" latinLnBrk="0" hangingPunct="1"/>
-              <a:t>10/13/23</a:t>
+              <a:t>11/16/23</a:t>
             </a:fld>
             <a:endParaRPr lang="en-US"/>
           </a:p>
@@ -3155,7 +3155,7 @@
             <a:fld id="{23A271A1-F6D6-438B-A432-4747EE7ECD40}" type="datetimeFigureOut">
               <a:rPr lang="en-US" smtClean="0"/>
               <a:pPr eaLnBrk="1" latinLnBrk="0" hangingPunct="1"/>
-              <a:t>10/13/23</a:t>
+              <a:t>11/16/23</a:t>
             </a:fld>
             <a:endParaRPr lang="en-US"/>
           </a:p>
@@ -3394,7 +3394,7 @@
             <a:fld id="{23A271A1-F6D6-438B-A432-4747EE7ECD40}" type="datetimeFigureOut">
               <a:rPr lang="en-US" smtClean="0"/>
               <a:pPr eaLnBrk="1" latinLnBrk="0" hangingPunct="1"/>
-              <a:t>10/13/23</a:t>
+              <a:t>11/16/23</a:t>
             </a:fld>
             <a:endParaRPr lang="en-US"/>
           </a:p>
@@ -3592,7 +3592,7 @@
             <a:fld id="{23A271A1-F6D6-438B-A432-4747EE7ECD40}" type="datetimeFigureOut">
               <a:rPr lang="en-US" smtClean="0"/>
               <a:pPr eaLnBrk="1" latinLnBrk="0" hangingPunct="1"/>
-              <a:t>10/13/23</a:t>
+              <a:t>11/16/23</a:t>
             </a:fld>
             <a:endParaRPr lang="en-US"/>
           </a:p>
@@ -3697,7 +3697,7 @@
             <a:fld id="{23A271A1-F6D6-438B-A432-4747EE7ECD40}" type="datetimeFigureOut">
               <a:rPr lang="en-US" smtClean="0"/>
               <a:pPr eaLnBrk="1" latinLnBrk="0" hangingPunct="1"/>
-              <a:t>10/13/23</a:t>
+              <a:t>11/16/23</a:t>
             </a:fld>
             <a:endParaRPr lang="en-US"/>
           </a:p>
@@ -3839,7 +3839,7 @@
             <a:fld id="{23A271A1-F6D6-438B-A432-4747EE7ECD40}" type="datetimeFigureOut">
               <a:rPr lang="en-US" smtClean="0"/>
               <a:pPr eaLnBrk="1" latinLnBrk="0" hangingPunct="1"/>
-              <a:t>10/13/23</a:t>
+              <a:t>11/16/23</a:t>
             </a:fld>
             <a:endParaRPr lang="en-US"/>
           </a:p>
@@ -4363,7 +4363,7 @@
             <a:fld id="{23A271A1-F6D6-438B-A432-4747EE7ECD40}" type="datetimeFigureOut">
               <a:rPr lang="en-US" smtClean="0"/>
               <a:pPr eaLnBrk="1" latinLnBrk="0" hangingPunct="1"/>
-              <a:t>10/13/23</a:t>
+              <a:t>11/16/23</a:t>
             </a:fld>
             <a:endParaRPr lang="en-US"/>
           </a:p>
@@ -4626,7 +4626,7 @@
             <a:fld id="{23A271A1-F6D6-438B-A432-4747EE7ECD40}" type="datetimeFigureOut">
               <a:rPr lang="en-US" smtClean="0"/>
               <a:pPr eaLnBrk="1" latinLnBrk="0" hangingPunct="1"/>
-              <a:t>10/13/23</a:t>
+              <a:t>11/16/23</a:t>
             </a:fld>
             <a:endParaRPr lang="en-US" sz="1400" dirty="0">
               <a:solidFill>
@@ -6989,7 +6989,7 @@
                       <a:noFill/>
                       <a:extLst>
                         <a:ext uri="{909E8E84-426E-40dd-AFC4-6F175D3DCCD1}">
-                          <a14:hiddenFill xmlns:a14="http://schemas.microsoft.com/office/drawing/2010/main" xmlns="">
+                          <a14:hiddenFill xmlns="" xmlns:a14="http://schemas.microsoft.com/office/drawing/2010/main">
                             <a:solidFill>
                               <a:srgbClr val="FFFFFF"/>
                             </a:solidFill>
@@ -7362,7 +7362,7 @@
                       <a:noFill/>
                       <a:extLst>
                         <a:ext uri="{909E8E84-426E-40dd-AFC4-6F175D3DCCD1}">
-                          <a14:hiddenFill xmlns:a14="http://schemas.microsoft.com/office/drawing/2010/main" xmlns="">
+                          <a14:hiddenFill xmlns="" xmlns:a14="http://schemas.microsoft.com/office/drawing/2010/main">
                             <a:solidFill>
                               <a:srgbClr val="FFFFFF"/>
                             </a:solidFill>
@@ -7463,7 +7463,7 @@
                       <a:noFill/>
                       <a:extLst>
                         <a:ext uri="{909E8E84-426E-40dd-AFC4-6F175D3DCCD1}">
-                          <a14:hiddenFill xmlns:a14="http://schemas.microsoft.com/office/drawing/2010/main" xmlns="">
+                          <a14:hiddenFill xmlns="" xmlns:a14="http://schemas.microsoft.com/office/drawing/2010/main">
                             <a:solidFill>
                               <a:srgbClr val="FFFFFF"/>
                             </a:solidFill>
@@ -7591,7 +7591,7 @@
                       <a:noFill/>
                       <a:extLst>
                         <a:ext uri="{909E8E84-426E-40dd-AFC4-6F175D3DCCD1}">
-                          <a14:hiddenFill xmlns:a14="http://schemas.microsoft.com/office/drawing/2010/main" xmlns="">
+                          <a14:hiddenFill xmlns="" xmlns:a14="http://schemas.microsoft.com/office/drawing/2010/main">
                             <a:solidFill>
                               <a:srgbClr val="FFFFFF"/>
                             </a:solidFill>
@@ -7789,7 +7789,7 @@
                       <a:noFill/>
                       <a:extLst>
                         <a:ext uri="{909E8E84-426E-40dd-AFC4-6F175D3DCCD1}">
-                          <a14:hiddenFill xmlns:a14="http://schemas.microsoft.com/office/drawing/2010/main" xmlns="">
+                          <a14:hiddenFill xmlns="" xmlns:a14="http://schemas.microsoft.com/office/drawing/2010/main">
                             <a:solidFill>
                               <a:srgbClr val="FFFFFF"/>
                             </a:solidFill>
@@ -8293,7 +8293,7 @@
                       <a:noFill/>
                       <a:extLst>
                         <a:ext uri="{909E8E84-426E-40dd-AFC4-6F175D3DCCD1}">
-                          <a14:hiddenFill xmlns:a14="http://schemas.microsoft.com/office/drawing/2010/main" xmlns="">
+                          <a14:hiddenFill xmlns="" xmlns:a14="http://schemas.microsoft.com/office/drawing/2010/main">
                             <a:solidFill>
                               <a:srgbClr val="FFFFFF"/>
                             </a:solidFill>
@@ -8514,7 +8514,7 @@
                   <a:srgbClr val="0000FF"/>
                 </a:solidFill>
               </a:rPr>
-              <a:t>If they’re the same sign, as the predicted gets larger there update gets smaller</a:t>
+              <a:t>If they’re the same sign, as the predicted gets larger the update gets smaller</a:t>
             </a:r>
           </a:p>
           <a:p>
@@ -9706,13 +9706,8 @@
             </a:r>
             <a:r>
               <a:rPr lang="en-US" dirty="0"/>
-              <a:t>is an additional criterion to the loss function to make sure that we don’t </a:t>
-            </a:r>
-            <a:r>
-              <a:rPr lang="en-US" dirty="0" err="1"/>
-              <a:t>overfit</a:t>
-            </a:r>
-            <a:endParaRPr lang="en-US" dirty="0"/>
+              <a:t>is an additional criterion to the loss function to make sure that we don’t overfit.</a:t>
+            </a:r>
           </a:p>
           <a:p>
             <a:pPr marL="0" indent="0">
@@ -9734,7 +9729,7 @@
             </a:r>
             <a:r>
               <a:rPr lang="en-US" dirty="0"/>
-              <a:t> since it tries to keep the parameters more normal/regular</a:t>
+              <a:t> since it tries to keep the parameters more normal/regular.</a:t>
             </a:r>
           </a:p>
           <a:p>
@@ -17012,7 +17007,7 @@
                       <a:noFill/>
                       <a:extLst>
                         <a:ext uri="{909E8E84-426E-40dd-AFC4-6F175D3DCCD1}">
-                          <a14:hiddenFill xmlns:a14="http://schemas.microsoft.com/office/drawing/2010/main" xmlns="">
+                          <a14:hiddenFill xmlns="" xmlns:a14="http://schemas.microsoft.com/office/drawing/2010/main">
                             <a:solidFill>
                               <a:srgbClr val="FFFFFF"/>
                             </a:solidFill>
@@ -17656,7 +17651,7 @@
                       <a:noFill/>
                       <a:extLst>
                         <a:ext uri="{909E8E84-426E-40dd-AFC4-6F175D3DCCD1}">
-                          <a14:hiddenFill xmlns:a14="http://schemas.microsoft.com/office/drawing/2010/main" xmlns="">
+                          <a14:hiddenFill xmlns="" xmlns:a14="http://schemas.microsoft.com/office/drawing/2010/main">
                             <a:solidFill>
                               <a:srgbClr val="FFFFFF"/>
                             </a:solidFill>
@@ -20321,7 +20316,7 @@
                       <a:noFill/>
                       <a:extLst>
                         <a:ext uri="{909E8E84-426E-40dd-AFC4-6F175D3DCCD1}">
-                          <a14:hiddenFill xmlns:a14="http://schemas.microsoft.com/office/drawing/2010/main" xmlns="">
+                          <a14:hiddenFill xmlns="" xmlns:a14="http://schemas.microsoft.com/office/drawing/2010/main">
                             <a:solidFill>
                               <a:srgbClr val="FFFFFF"/>
                             </a:solidFill>
@@ -20982,7 +20977,7 @@
                       <a:noFill/>
                       <a:extLst>
                         <a:ext uri="{909E8E84-426E-40dd-AFC4-6F175D3DCCD1}">
-                          <a14:hiddenFill xmlns:a14="http://schemas.microsoft.com/office/drawing/2010/main" xmlns="">
+                          <a14:hiddenFill xmlns="" xmlns:a14="http://schemas.microsoft.com/office/drawing/2010/main">
                             <a:solidFill>
                               <a:srgbClr val="FFFFFF"/>
                             </a:solidFill>
@@ -21052,7 +21047,7 @@
                       <a:noFill/>
                       <a:extLst>
                         <a:ext uri="{909E8E84-426E-40dd-AFC4-6F175D3DCCD1}">
-                          <a14:hiddenFill xmlns:a14="http://schemas.microsoft.com/office/drawing/2010/main" xmlns="">
+                          <a14:hiddenFill xmlns="" xmlns:a14="http://schemas.microsoft.com/office/drawing/2010/main">
                             <a:solidFill>
                               <a:srgbClr val="FFFFFF"/>
                             </a:solidFill>
@@ -21185,8 +21180,8 @@
           </a:p>
         </p:txBody>
       </p:sp>
-      <mc:AlternateContent xmlns:mc="http://schemas.openxmlformats.org/markup-compatibility/2006" xmlns:a14="http://schemas.microsoft.com/office/drawing/2010/main">
-        <mc:Choice Requires="a14">
+      <mc:AlternateContent xmlns:mc="http://schemas.openxmlformats.org/markup-compatibility/2006">
+        <mc:Choice xmlns:a14="http://schemas.microsoft.com/office/drawing/2010/main" Requires="a14">
           <p:sp>
             <p:nvSpPr>
               <p:cNvPr id="3" name="TextBox 2">
@@ -21202,7 +21197,7 @@
             <p:spPr>
               <a:xfrm>
                 <a:off x="2588903" y="1710809"/>
-                <a:ext cx="3489866" cy="461665"/>
+                <a:ext cx="3495124" cy="461665"/>
               </a:xfrm>
               <a:prstGeom prst="rect">
                 <a:avLst/>
@@ -21283,10 +21278,38 @@
                         <a:latin typeface="Cambria Math" panose="02040503050406030204" pitchFamily="18" charset="0"/>
                         <a:ea typeface="Cambria Math" panose="02040503050406030204" pitchFamily="18" charset="0"/>
                       </a:rPr>
-                      <m:t>𝑦𝑖𝑥𝑖𝑗</m:t>
+                      <m:t>𝑦𝑖</m:t>
+                    </m:r>
+                    <m:r>
+                      <a:rPr lang="en-US" sz="2400" b="0" i="1" dirty="0" smtClean="0">
+                        <a:latin typeface="Cambria Math" panose="02040503050406030204" pitchFamily="18" charset="0"/>
+                        <a:ea typeface="Cambria Math" panose="02040503050406030204" pitchFamily="18" charset="0"/>
+                      </a:rPr>
+                      <m:t>𝑥</m:t>
                     </m:r>
                     <m:r>
                       <a:rPr lang="en-US" sz="2400" b="0" i="1" baseline="-25000" dirty="0" smtClean="0">
+                        <a:latin typeface="Cambria Math" panose="02040503050406030204" pitchFamily="18" charset="0"/>
+                        <a:ea typeface="Cambria Math" panose="02040503050406030204" pitchFamily="18" charset="0"/>
+                      </a:rPr>
+                      <m:t>𝑖</m:t>
+                    </m:r>
+                    <m:r>
+                      <a:rPr lang="en-US" sz="2400" b="0" i="1" baseline="-25000" dirty="0" smtClean="0">
+                        <a:latin typeface="Cambria Math" panose="02040503050406030204" pitchFamily="18" charset="0"/>
+                        <a:ea typeface="Cambria Math" panose="02040503050406030204" pitchFamily="18" charset="0"/>
+                      </a:rPr>
+                      <m:t>𝑗</m:t>
+                    </m:r>
+                    <m:r>
+                      <a:rPr lang="en-US" sz="2400" b="0" i="1" dirty="0" smtClean="0">
+                        <a:latin typeface="Cambria Math" panose="02040503050406030204" pitchFamily="18" charset="0"/>
+                        <a:ea typeface="Cambria Math" panose="02040503050406030204" pitchFamily="18" charset="0"/>
+                      </a:rPr>
+                      <m:t> </m:t>
+                    </m:r>
+                    <m:r>
+                      <a:rPr lang="en-US" sz="2400" b="0" i="1" dirty="0" smtClean="0">
                         <a:latin typeface="Cambria Math" panose="02040503050406030204" pitchFamily="18" charset="0"/>
                         <a:ea typeface="Cambria Math" panose="02040503050406030204" pitchFamily="18" charset="0"/>
                       </a:rPr>
@@ -21297,7 +21320,7 @@
                         <a:latin typeface="Cambria Math" panose="02040503050406030204" pitchFamily="18" charset="0"/>
                         <a:ea typeface="Cambria Math" panose="02040503050406030204" pitchFamily="18" charset="0"/>
                       </a:rPr>
-                      <m:t> − </m:t>
+                      <m:t>− </m:t>
                     </m:r>
                     <m:r>
                       <a:rPr lang="en-US" sz="2400" b="0" i="1" dirty="0" smtClean="0">
@@ -21327,7 +21350,7 @@
             </p:txBody>
           </p:sp>
         </mc:Choice>
-        <mc:Fallback xmlns="">
+        <mc:Fallback>
           <p:sp>
             <p:nvSpPr>
               <p:cNvPr id="3" name="TextBox 2">
@@ -21345,15 +21368,15 @@
             <p:spPr>
               <a:xfrm>
                 <a:off x="2588903" y="1710809"/>
-                <a:ext cx="3489866" cy="461665"/>
+                <a:ext cx="3495124" cy="461665"/>
               </a:xfrm>
               <a:prstGeom prst="rect">
                 <a:avLst/>
               </a:prstGeom>
               <a:blipFill>
-                <a:blip r:embed="rId7"/>
+                <a:blip r:embed="rId6"/>
                 <a:stretch>
-                  <a:fillRect r="-727" b="-24324"/>
+                  <a:fillRect r="-362" b="-24324"/>
                 </a:stretch>
               </a:blipFill>
             </p:spPr>
@@ -22166,8 +22189,8 @@
           </a:p>
         </p:txBody>
       </p:sp>
-      <mc:AlternateContent xmlns:mc="http://schemas.openxmlformats.org/markup-compatibility/2006">
-        <mc:Choice xmlns:a14="http://schemas.microsoft.com/office/drawing/2010/main" Requires="a14">
+      <mc:AlternateContent xmlns:mc="http://schemas.openxmlformats.org/markup-compatibility/2006" xmlns:a14="http://schemas.microsoft.com/office/drawing/2010/main">
+        <mc:Choice Requires="a14">
           <p:sp>
             <p:nvSpPr>
               <p:cNvPr id="6" name="TextBox 5">
@@ -22264,28 +22287,14 @@
                         <a:latin typeface="Cambria Math" panose="02040503050406030204" pitchFamily="18" charset="0"/>
                         <a:ea typeface="Cambria Math" panose="02040503050406030204" pitchFamily="18" charset="0"/>
                       </a:rPr>
-                      <m:t>𝑦𝑖</m:t>
-                    </m:r>
-                    <m:r>
-                      <a:rPr lang="en-US" sz="2400" b="0" i="1" dirty="0" smtClean="0">
-                        <a:latin typeface="Cambria Math" panose="02040503050406030204" pitchFamily="18" charset="0"/>
-                        <a:ea typeface="Cambria Math" panose="02040503050406030204" pitchFamily="18" charset="0"/>
-                      </a:rPr>
-                      <m:t>𝑥</m:t>
+                      <m:t>𝑦𝑖𝑥𝑖</m:t>
                     </m:r>
                     <m:r>
                       <a:rPr lang="en-US" sz="2400" b="0" i="1" baseline="-25000" dirty="0" smtClean="0">
                         <a:latin typeface="Cambria Math" panose="02040503050406030204" pitchFamily="18" charset="0"/>
                         <a:ea typeface="Cambria Math" panose="02040503050406030204" pitchFamily="18" charset="0"/>
                       </a:rPr>
-                      <m:t>𝑖𝑗</m:t>
-                    </m:r>
-                    <m:r>
-                      <a:rPr lang="en-US" sz="2400" b="0" i="1" dirty="0" smtClean="0">
-                        <a:latin typeface="Cambria Math" panose="02040503050406030204" pitchFamily="18" charset="0"/>
-                        <a:ea typeface="Cambria Math" panose="02040503050406030204" pitchFamily="18" charset="0"/>
-                      </a:rPr>
-                      <m:t>𝑐</m:t>
+                      <m:t>𝑗𝑐</m:t>
                     </m:r>
                     <m:r>
                       <a:rPr lang="en-US" sz="2400" b="0" i="1" dirty="0" smtClean="0">
@@ -22322,7 +22331,7 @@
             </p:txBody>
           </p:sp>
         </mc:Choice>
-        <mc:Fallback>
+        <mc:Fallback xmlns="">
           <p:sp>
             <p:nvSpPr>
               <p:cNvPr id="6" name="TextBox 5">
@@ -22585,14 +22594,7 @@
                         <a:latin typeface="Cambria Math" panose="02040503050406030204" pitchFamily="18" charset="0"/>
                         <a:ea typeface="Cambria Math" panose="02040503050406030204" pitchFamily="18" charset="0"/>
                       </a:rPr>
-                      <m:t>𝑦𝑖𝑥𝑖𝑗</m:t>
-                    </m:r>
-                    <m:r>
-                      <a:rPr lang="en-US" sz="2400" b="0" i="1" baseline="-25000" dirty="0" smtClean="0">
-                        <a:latin typeface="Cambria Math" panose="02040503050406030204" pitchFamily="18" charset="0"/>
-                        <a:ea typeface="Cambria Math" panose="02040503050406030204" pitchFamily="18" charset="0"/>
-                      </a:rPr>
-                      <m:t>𝑐</m:t>
+                      <m:t>𝑦𝑖𝑥𝑖𝑗𝑐</m:t>
                     </m:r>
                     <m:r>
                       <a:rPr lang="en-US" sz="2400" b="0" i="1" dirty="0" smtClean="0">
@@ -23394,7 +23396,7 @@
                       <a:noFill/>
                       <a:extLst>
                         <a:ext uri="{909E8E84-426E-40dd-AFC4-6F175D3DCCD1}">
-                          <a14:hiddenFill xmlns:a14="http://schemas.microsoft.com/office/drawing/2010/main" xmlns="">
+                          <a14:hiddenFill xmlns="" xmlns:a14="http://schemas.microsoft.com/office/drawing/2010/main">
                             <a:solidFill>
                               <a:srgbClr val="FFFFFF"/>
                             </a:solidFill>
@@ -23464,7 +23466,7 @@
                       <a:noFill/>
                       <a:extLst>
                         <a:ext uri="{909E8E84-426E-40dd-AFC4-6F175D3DCCD1}">
-                          <a14:hiddenFill xmlns:a14="http://schemas.microsoft.com/office/drawing/2010/main" xmlns="">
+                          <a14:hiddenFill xmlns="" xmlns:a14="http://schemas.microsoft.com/office/drawing/2010/main">
                             <a:solidFill>
                               <a:srgbClr val="FFFFFF"/>
                             </a:solidFill>

</xml_diff>